<commit_message>
updating presentation and article in french
</commit_message>
<xml_diff>
--- a/img/presentation/presentation_planche_a_decouper_fonctionnelle.pptx
+++ b/img/presentation/presentation_planche_a_decouper_fonctionnelle.pptx
@@ -5,7 +5,7 @@
     <p:sldMasterId id="2147483648" r:id="rId1"/>
   </p:sldMasterIdLst>
   <p:notesMasterIdLst>
-    <p:notesMasterId r:id="rId27"/>
+    <p:notesMasterId r:id="rId26"/>
   </p:notesMasterIdLst>
   <p:sldIdLst>
     <p:sldId id="256" r:id="rId2"/>
@@ -19,20 +19,19 @@
     <p:sldId id="266" r:id="rId10"/>
     <p:sldId id="267" r:id="rId11"/>
     <p:sldId id="268" r:id="rId12"/>
-    <p:sldId id="269" r:id="rId13"/>
-    <p:sldId id="270" r:id="rId14"/>
-    <p:sldId id="271" r:id="rId15"/>
-    <p:sldId id="272" r:id="rId16"/>
-    <p:sldId id="273" r:id="rId17"/>
-    <p:sldId id="274" r:id="rId18"/>
-    <p:sldId id="275" r:id="rId19"/>
-    <p:sldId id="276" r:id="rId20"/>
-    <p:sldId id="277" r:id="rId21"/>
-    <p:sldId id="278" r:id="rId22"/>
-    <p:sldId id="279" r:id="rId23"/>
-    <p:sldId id="280" r:id="rId24"/>
-    <p:sldId id="281" r:id="rId25"/>
-    <p:sldId id="282" r:id="rId26"/>
+    <p:sldId id="270" r:id="rId13"/>
+    <p:sldId id="271" r:id="rId14"/>
+    <p:sldId id="272" r:id="rId15"/>
+    <p:sldId id="273" r:id="rId16"/>
+    <p:sldId id="274" r:id="rId17"/>
+    <p:sldId id="275" r:id="rId18"/>
+    <p:sldId id="276" r:id="rId19"/>
+    <p:sldId id="277" r:id="rId20"/>
+    <p:sldId id="278" r:id="rId21"/>
+    <p:sldId id="279" r:id="rId22"/>
+    <p:sldId id="280" r:id="rId23"/>
+    <p:sldId id="281" r:id="rId24"/>
+    <p:sldId id="282" r:id="rId25"/>
   </p:sldIdLst>
   <p:sldSz cx="12192000" cy="6858000"/>
   <p:notesSz cx="6858000" cy="9144000"/>
@@ -225,7 +224,7 @@
           <a:p>
             <a:fld id="{C14D5BAD-2922-4BDA-86BD-98874C24C505}" type="datetimeFigureOut">
               <a:rPr lang="fr-FR" smtClean="0"/>
-              <a:t>25/08/2017</a:t>
+              <a:t>18/10/2017</a:t>
             </a:fld>
             <a:endParaRPr lang="fr-FR"/>
           </a:p>
@@ -675,7 +674,7 @@
           <a:p>
             <a:fld id="{C71C5CCA-E8E3-40D9-806D-74F3057F3C3F}" type="datetime1">
               <a:rPr lang="fr-FR" smtClean="0"/>
-              <a:t>25/08/2017</a:t>
+              <a:t>18/10/2017</a:t>
             </a:fld>
             <a:endParaRPr lang="fr-FR"/>
           </a:p>
@@ -935,7 +934,7 @@
           <a:p>
             <a:fld id="{62E5F56D-BF69-4A33-810C-EDDAE27F209A}" type="datetime1">
               <a:rPr lang="fr-FR" smtClean="0"/>
-              <a:t>25/08/2017</a:t>
+              <a:t>18/10/2017</a:t>
             </a:fld>
             <a:endParaRPr lang="fr-FR"/>
           </a:p>
@@ -1143,7 +1142,7 @@
           <a:p>
             <a:fld id="{8F08AD1D-ADDD-44A4-9EFD-95A267F464F9}" type="datetime1">
               <a:rPr lang="fr-FR" smtClean="0"/>
-              <a:t>25/08/2017</a:t>
+              <a:t>18/10/2017</a:t>
             </a:fld>
             <a:endParaRPr lang="fr-FR"/>
           </a:p>
@@ -1341,7 +1340,7 @@
           <a:p>
             <a:fld id="{12F20880-C31B-47C4-B271-CC23999EEFEA}" type="datetime1">
               <a:rPr lang="fr-FR" smtClean="0"/>
-              <a:t>25/08/2017</a:t>
+              <a:t>18/10/2017</a:t>
             </a:fld>
             <a:endParaRPr lang="fr-FR"/>
           </a:p>
@@ -1616,7 +1615,7 @@
           <a:p>
             <a:fld id="{C9087C35-56C5-4776-9170-62F84B7534FF}" type="datetime1">
               <a:rPr lang="fr-FR" smtClean="0"/>
-              <a:t>25/08/2017</a:t>
+              <a:t>18/10/2017</a:t>
             </a:fld>
             <a:endParaRPr lang="fr-FR"/>
           </a:p>
@@ -1917,7 +1916,7 @@
           <a:p>
             <a:fld id="{C61D65BF-000F-4B88-919B-3D69FD02E4E7}" type="datetime1">
               <a:rPr lang="fr-FR" smtClean="0"/>
-              <a:t>25/08/2017</a:t>
+              <a:t>18/10/2017</a:t>
             </a:fld>
             <a:endParaRPr lang="fr-FR"/>
           </a:p>
@@ -2329,7 +2328,7 @@
           <a:p>
             <a:fld id="{FBAE1E2C-53AD-42DF-AC8E-58495AB72F11}" type="datetime1">
               <a:rPr lang="fr-FR" smtClean="0"/>
-              <a:t>25/08/2017</a:t>
+              <a:t>18/10/2017</a:t>
             </a:fld>
             <a:endParaRPr lang="fr-FR"/>
           </a:p>
@@ -2470,7 +2469,7 @@
           <a:p>
             <a:fld id="{C26CF1A5-5461-4A25-A02A-89AC9A5C7584}" type="datetime1">
               <a:rPr lang="fr-FR" smtClean="0"/>
-              <a:t>25/08/2017</a:t>
+              <a:t>18/10/2017</a:t>
             </a:fld>
             <a:endParaRPr lang="fr-FR"/>
           </a:p>
@@ -2583,7 +2582,7 @@
           <a:p>
             <a:fld id="{67A19EC3-3E4F-494F-BE8C-1A23BAE6FFC7}" type="datetime1">
               <a:rPr lang="fr-FR" smtClean="0"/>
-              <a:t>25/08/2017</a:t>
+              <a:t>18/10/2017</a:t>
             </a:fld>
             <a:endParaRPr lang="fr-FR"/>
           </a:p>
@@ -2894,7 +2893,7 @@
           <a:p>
             <a:fld id="{E0A440B1-4BBA-4611-9C77-055D6FB01103}" type="datetime1">
               <a:rPr lang="fr-FR" smtClean="0"/>
-              <a:t>25/08/2017</a:t>
+              <a:t>18/10/2017</a:t>
             </a:fld>
             <a:endParaRPr lang="fr-FR"/>
           </a:p>
@@ -3182,7 +3181,7 @@
           <a:p>
             <a:fld id="{904902A0-D81F-4B67-9933-47F4A20A0B19}" type="datetime1">
               <a:rPr lang="fr-FR" smtClean="0"/>
-              <a:t>25/08/2017</a:t>
+              <a:t>18/10/2017</a:t>
             </a:fld>
             <a:endParaRPr lang="fr-FR"/>
           </a:p>
@@ -3423,7 +3422,7 @@
           <a:p>
             <a:fld id="{15433CDC-BE10-41F5-AA6A-69D418CD0D29}" type="datetime1">
               <a:rPr lang="fr-FR" smtClean="0"/>
-              <a:t>25/08/2017</a:t>
+              <a:t>18/10/2017</a:t>
             </a:fld>
             <a:endParaRPr lang="fr-FR"/>
           </a:p>
@@ -4822,272 +4821,6 @@
           <a:chExt cx="0" cy="0"/>
         </a:xfrm>
       </p:grpSpPr>
-      <p:sp>
-        <p:nvSpPr>
-          <p:cNvPr id="2" name="Titre 1">
-            <a:extLst>
-              <a:ext uri="{FF2B5EF4-FFF2-40B4-BE49-F238E27FC236}">
-                <a16:creationId xmlns:a16="http://schemas.microsoft.com/office/drawing/2014/main" id="{476982B9-626F-4BB0-895F-2D5B5D244373}"/>
-              </a:ext>
-            </a:extLst>
-          </p:cNvPr>
-          <p:cNvSpPr>
-            <a:spLocks noGrp="1"/>
-          </p:cNvSpPr>
-          <p:nvPr>
-            <p:ph type="title"/>
-          </p:nvPr>
-        </p:nvSpPr>
-        <p:spPr/>
-        <p:txBody>
-          <a:bodyPr/>
-          <a:lstStyle/>
-          <a:p>
-            <a:r>
-              <a:rPr lang="fr-FR" dirty="0"/>
-              <a:t>Design</a:t>
-            </a:r>
-          </a:p>
-        </p:txBody>
-      </p:sp>
-      <p:sp>
-        <p:nvSpPr>
-          <p:cNvPr id="4" name="Espace réservé du texte 3">
-            <a:extLst>
-              <a:ext uri="{FF2B5EF4-FFF2-40B4-BE49-F238E27FC236}">
-                <a16:creationId xmlns:a16="http://schemas.microsoft.com/office/drawing/2014/main" id="{57ED7B7B-A216-4343-9A28-D19C39C3DAFB}"/>
-              </a:ext>
-            </a:extLst>
-          </p:cNvPr>
-          <p:cNvSpPr>
-            <a:spLocks noGrp="1"/>
-          </p:cNvSpPr>
-          <p:nvPr>
-            <p:ph sz="half" idx="1"/>
-          </p:nvPr>
-        </p:nvSpPr>
-        <p:spPr>
-          <a:xfrm>
-            <a:off x="838200" y="1825625"/>
-            <a:ext cx="6375400" cy="4351338"/>
-          </a:xfrm>
-        </p:spPr>
-        <p:txBody>
-          <a:bodyPr/>
-          <a:lstStyle/>
-          <a:p>
-            <a:pPr lvl="0"/>
-            <a:r>
-              <a:rPr lang="fr-FR" sz="3200" dirty="0">
-                <a:solidFill>
-                  <a:prstClr val="black"/>
-                </a:solidFill>
-                <a:latin typeface="Calibri Light" panose="020F0302020204030204"/>
-                <a:ea typeface="+mj-ea"/>
-                <a:cs typeface="+mj-cs"/>
-              </a:rPr>
-              <a:t>Choix du design : Bois </a:t>
-            </a:r>
-            <a:r>
-              <a:rPr lang="fr-FR" sz="3200" b="1" dirty="0">
-                <a:solidFill>
-                  <a:prstClr val="black"/>
-                </a:solidFill>
-                <a:latin typeface="Calibri Light" panose="020F0302020204030204"/>
-                <a:ea typeface="+mj-ea"/>
-                <a:cs typeface="+mj-cs"/>
-              </a:rPr>
-              <a:t>de bout</a:t>
-            </a:r>
-          </a:p>
-          <a:p>
-            <a:pPr lvl="1"/>
-            <a:r>
-              <a:rPr lang="fr-FR" sz="2800" dirty="0">
-                <a:solidFill>
-                  <a:prstClr val="black"/>
-                </a:solidFill>
-                <a:latin typeface="Calibri Light" panose="020F0302020204030204"/>
-                <a:ea typeface="+mj-ea"/>
-                <a:cs typeface="+mj-cs"/>
-              </a:rPr>
-              <a:t>Plus dur</a:t>
-            </a:r>
-          </a:p>
-          <a:p>
-            <a:pPr lvl="1"/>
-            <a:r>
-              <a:rPr lang="fr-FR" sz="2800" dirty="0" err="1">
-                <a:solidFill>
-                  <a:prstClr val="black"/>
-                </a:solidFill>
-                <a:latin typeface="Calibri Light" panose="020F0302020204030204"/>
-                <a:ea typeface="+mj-ea"/>
-                <a:cs typeface="+mj-cs"/>
-              </a:rPr>
-              <a:t>Auto-réparant</a:t>
-            </a:r>
-            <a:r>
-              <a:rPr lang="fr-FR" sz="2800" dirty="0">
-                <a:solidFill>
-                  <a:prstClr val="black"/>
-                </a:solidFill>
-                <a:latin typeface="Calibri Light" panose="020F0302020204030204"/>
-                <a:ea typeface="+mj-ea"/>
-                <a:cs typeface="+mj-cs"/>
-              </a:rPr>
-              <a:t> </a:t>
-            </a:r>
-            <a:br>
-              <a:rPr lang="fr-FR" sz="2800" dirty="0">
-                <a:solidFill>
-                  <a:prstClr val="black"/>
-                </a:solidFill>
-                <a:latin typeface="Calibri Light" panose="020F0302020204030204"/>
-                <a:ea typeface="+mj-ea"/>
-                <a:cs typeface="+mj-cs"/>
-              </a:rPr>
-            </a:br>
-            <a:r>
-              <a:rPr lang="fr-FR" sz="2800" dirty="0">
-                <a:solidFill>
-                  <a:prstClr val="black"/>
-                </a:solidFill>
-                <a:latin typeface="Calibri Light" panose="020F0302020204030204"/>
-                <a:ea typeface="+mj-ea"/>
-                <a:cs typeface="+mj-cs"/>
-              </a:rPr>
-              <a:t>	(les fibres s’écartent autour de la lame et se referment)</a:t>
-            </a:r>
-          </a:p>
-          <a:p>
-            <a:pPr lvl="1"/>
-            <a:r>
-              <a:rPr lang="fr-FR" sz="2800" dirty="0">
-                <a:solidFill>
-                  <a:prstClr val="black"/>
-                </a:solidFill>
-                <a:latin typeface="Calibri Light" panose="020F0302020204030204"/>
-                <a:ea typeface="+mj-ea"/>
-                <a:cs typeface="+mj-cs"/>
-              </a:rPr>
-              <a:t>Plus stable</a:t>
-            </a:r>
-          </a:p>
-          <a:p>
-            <a:pPr marL="914400" lvl="2" indent="0">
-              <a:buNone/>
-            </a:pPr>
-            <a:endParaRPr lang="fr-FR" sz="2400" dirty="0">
-              <a:solidFill>
-                <a:prstClr val="black"/>
-              </a:solidFill>
-              <a:latin typeface="Calibri Light" panose="020F0302020204030204"/>
-              <a:ea typeface="+mj-ea"/>
-              <a:cs typeface="+mj-cs"/>
-            </a:endParaRPr>
-          </a:p>
-          <a:p>
-            <a:endParaRPr lang="fr-FR" dirty="0"/>
-          </a:p>
-        </p:txBody>
-      </p:sp>
-      <p:sp>
-        <p:nvSpPr>
-          <p:cNvPr id="5" name="Espace réservé du numéro de diapositive 4">
-            <a:extLst>
-              <a:ext uri="{FF2B5EF4-FFF2-40B4-BE49-F238E27FC236}">
-                <a16:creationId xmlns:a16="http://schemas.microsoft.com/office/drawing/2014/main" id="{10AF192B-7E3E-4F86-B242-E1B18D92F241}"/>
-              </a:ext>
-            </a:extLst>
-          </p:cNvPr>
-          <p:cNvSpPr>
-            <a:spLocks noGrp="1"/>
-          </p:cNvSpPr>
-          <p:nvPr>
-            <p:ph type="sldNum" sz="quarter" idx="12"/>
-          </p:nvPr>
-        </p:nvSpPr>
-        <p:spPr/>
-        <p:txBody>
-          <a:bodyPr/>
-          <a:lstStyle/>
-          <a:p>
-            <a:fld id="{0EB16064-981D-404B-9686-DC1BCF903C68}" type="slidenum">
-              <a:rPr lang="fr-FR" smtClean="0"/>
-              <a:pPr/>
-              <a:t>12</a:t>
-            </a:fld>
-            <a:endParaRPr lang="fr-FR"/>
-          </a:p>
-        </p:txBody>
-      </p:sp>
-      <p:pic>
-        <p:nvPicPr>
-          <p:cNvPr id="7" name="Image 6">
-            <a:extLst>
-              <a:ext uri="{FF2B5EF4-FFF2-40B4-BE49-F238E27FC236}">
-                <a16:creationId xmlns:a16="http://schemas.microsoft.com/office/drawing/2014/main" id="{D1050966-82A2-47B5-A768-6CAB90D9A131}"/>
-              </a:ext>
-            </a:extLst>
-          </p:cNvPr>
-          <p:cNvPicPr>
-            <a:picLocks noChangeAspect="1"/>
-          </p:cNvPicPr>
-          <p:nvPr/>
-        </p:nvPicPr>
-        <p:blipFill>
-          <a:blip r:embed="rId2">
-            <a:extLst>
-              <a:ext uri="{28A0092B-C50C-407E-A947-70E740481C1C}">
-                <a14:useLocalDpi xmlns:a14="http://schemas.microsoft.com/office/drawing/2010/main" val="0"/>
-              </a:ext>
-            </a:extLst>
-          </a:blip>
-          <a:stretch>
-            <a:fillRect/>
-          </a:stretch>
-        </p:blipFill>
-        <p:spPr>
-          <a:xfrm>
-            <a:off x="6934200" y="2778409"/>
-            <a:ext cx="5128562" cy="3760503"/>
-          </a:xfrm>
-          <a:prstGeom prst="rect">
-            <a:avLst/>
-          </a:prstGeom>
-        </p:spPr>
-      </p:pic>
-    </p:spTree>
-    <p:extLst>
-      <p:ext uri="{BB962C8B-B14F-4D97-AF65-F5344CB8AC3E}">
-        <p14:creationId xmlns:p14="http://schemas.microsoft.com/office/powerpoint/2010/main" val="3967418846"/>
-      </p:ext>
-    </p:extLst>
-  </p:cSld>
-  <p:clrMapOvr>
-    <a:masterClrMapping/>
-  </p:clrMapOvr>
-</p:sld>
-</file>
-
-<file path=ppt/slides/slide13.xml><?xml version="1.0" encoding="utf-8"?>
-<p:sld xmlns:a="http://schemas.openxmlformats.org/drawingml/2006/main" xmlns:r="http://schemas.openxmlformats.org/officeDocument/2006/relationships" xmlns:p="http://schemas.openxmlformats.org/presentationml/2006/main">
-  <p:cSld>
-    <p:spTree>
-      <p:nvGrpSpPr>
-        <p:cNvPr id="1" name=""/>
-        <p:cNvGrpSpPr/>
-        <p:nvPr/>
-      </p:nvGrpSpPr>
-      <p:grpSpPr>
-        <a:xfrm>
-          <a:off x="0" y="0"/>
-          <a:ext cx="0" cy="0"/>
-          <a:chOff x="0" y="0"/>
-          <a:chExt cx="0" cy="0"/>
-        </a:xfrm>
-      </p:grpSpPr>
       <p:pic>
         <p:nvPicPr>
           <p:cNvPr id="3" name="Image 2">
@@ -5312,7 +5045,7 @@
             <a:fld id="{0EB16064-981D-404B-9686-DC1BCF903C68}" type="slidenum">
               <a:rPr lang="fr-FR" smtClean="0"/>
               <a:pPr/>
-              <a:t>13</a:t>
+              <a:t>12</a:t>
             </a:fld>
             <a:endParaRPr lang="fr-FR"/>
           </a:p>
@@ -5367,7 +5100,7 @@
 </p:sld>
 </file>
 
-<file path=ppt/slides/slide14.xml><?xml version="1.0" encoding="utf-8"?>
+<file path=ppt/slides/slide13.xml><?xml version="1.0" encoding="utf-8"?>
 <p:sld xmlns:a="http://schemas.openxmlformats.org/drawingml/2006/main" xmlns:r="http://schemas.openxmlformats.org/officeDocument/2006/relationships" xmlns:p="http://schemas.openxmlformats.org/presentationml/2006/main">
   <p:cSld>
     <p:spTree>
@@ -5644,7 +5377,7 @@
             <a:fld id="{0EB16064-981D-404B-9686-DC1BCF903C68}" type="slidenum">
               <a:rPr lang="fr-FR" smtClean="0"/>
               <a:pPr/>
-              <a:t>14</a:t>
+              <a:t>13</a:t>
             </a:fld>
             <a:endParaRPr lang="fr-FR" dirty="0"/>
           </a:p>
@@ -5699,7 +5432,7 @@
 </p:sld>
 </file>
 
-<file path=ppt/slides/slide15.xml><?xml version="1.0" encoding="utf-8"?>
+<file path=ppt/slides/slide14.xml><?xml version="1.0" encoding="utf-8"?>
 <p:sld xmlns:a="http://schemas.openxmlformats.org/drawingml/2006/main" xmlns:r="http://schemas.openxmlformats.org/officeDocument/2006/relationships" xmlns:p="http://schemas.openxmlformats.org/presentationml/2006/main">
   <p:cSld>
     <p:spTree>
@@ -5907,7 +5640,7 @@
             <a:fld id="{0EB16064-981D-404B-9686-DC1BCF903C68}" type="slidenum">
               <a:rPr lang="fr-FR" smtClean="0"/>
               <a:pPr/>
-              <a:t>15</a:t>
+              <a:t>14</a:t>
             </a:fld>
             <a:endParaRPr lang="fr-FR" dirty="0"/>
           </a:p>
@@ -5962,7 +5695,7 @@
 </p:sld>
 </file>
 
-<file path=ppt/slides/slide16.xml><?xml version="1.0" encoding="utf-8"?>
+<file path=ppt/slides/slide15.xml><?xml version="1.0" encoding="utf-8"?>
 <p:sld xmlns:a="http://schemas.openxmlformats.org/drawingml/2006/main" xmlns:r="http://schemas.openxmlformats.org/officeDocument/2006/relationships" xmlns:p="http://schemas.openxmlformats.org/presentationml/2006/main">
   <p:cSld>
     <p:spTree>
@@ -6222,7 +5955,7 @@
             <a:fld id="{0EB16064-981D-404B-9686-DC1BCF903C68}" type="slidenum">
               <a:rPr lang="fr-FR" smtClean="0"/>
               <a:pPr/>
-              <a:t>16</a:t>
+              <a:t>15</a:t>
             </a:fld>
             <a:endParaRPr lang="fr-FR" dirty="0"/>
           </a:p>
@@ -6277,6 +6010,139 @@
 </p:sld>
 </file>
 
+<file path=ppt/slides/slide16.xml><?xml version="1.0" encoding="utf-8"?>
+<p:sld xmlns:a="http://schemas.openxmlformats.org/drawingml/2006/main" xmlns:r="http://schemas.openxmlformats.org/officeDocument/2006/relationships" xmlns:p="http://schemas.openxmlformats.org/presentationml/2006/main">
+  <p:cSld>
+    <p:spTree>
+      <p:nvGrpSpPr>
+        <p:cNvPr id="1" name=""/>
+        <p:cNvGrpSpPr/>
+        <p:nvPr/>
+      </p:nvGrpSpPr>
+      <p:grpSpPr>
+        <a:xfrm>
+          <a:off x="0" y="0"/>
+          <a:ext cx="0" cy="0"/>
+          <a:chOff x="0" y="0"/>
+          <a:chExt cx="0" cy="0"/>
+        </a:xfrm>
+      </p:grpSpPr>
+      <p:sp>
+        <p:nvSpPr>
+          <p:cNvPr id="2" name="Titre 1">
+            <a:extLst>
+              <a:ext uri="{FF2B5EF4-FFF2-40B4-BE49-F238E27FC236}">
+                <a16:creationId xmlns:a16="http://schemas.microsoft.com/office/drawing/2014/main" id="{FADDA114-0720-47CB-A542-7C89182D4503}"/>
+              </a:ext>
+            </a:extLst>
+          </p:cNvPr>
+          <p:cNvSpPr>
+            <a:spLocks noGrp="1"/>
+          </p:cNvSpPr>
+          <p:nvPr>
+            <p:ph type="title"/>
+          </p:nvPr>
+        </p:nvSpPr>
+        <p:spPr/>
+        <p:txBody>
+          <a:bodyPr>
+            <a:normAutofit/>
+          </a:bodyPr>
+          <a:lstStyle/>
+          <a:p>
+            <a:r>
+              <a:rPr lang="fr-FR" dirty="0"/>
+              <a:t>Fabrication</a:t>
+            </a:r>
+          </a:p>
+        </p:txBody>
+      </p:sp>
+      <p:sp>
+        <p:nvSpPr>
+          <p:cNvPr id="3" name="Espace réservé du texte 2">
+            <a:extLst>
+              <a:ext uri="{FF2B5EF4-FFF2-40B4-BE49-F238E27FC236}">
+                <a16:creationId xmlns:a16="http://schemas.microsoft.com/office/drawing/2014/main" id="{8B13CBC0-C582-4596-BD45-751B4C3E9998}"/>
+              </a:ext>
+            </a:extLst>
+          </p:cNvPr>
+          <p:cNvSpPr>
+            <a:spLocks noGrp="1"/>
+          </p:cNvSpPr>
+          <p:nvPr>
+            <p:ph type="body" idx="1"/>
+          </p:nvPr>
+        </p:nvSpPr>
+        <p:spPr/>
+        <p:txBody>
+          <a:bodyPr/>
+          <a:lstStyle/>
+          <a:p>
+            <a:pPr lvl="1"/>
+            <a:r>
+              <a:rPr lang="fr-FR" dirty="0"/>
+              <a:t>Plateau</a:t>
+            </a:r>
+            <a:br>
+              <a:rPr lang="fr-FR" dirty="0"/>
+            </a:br>
+            <a:r>
+              <a:rPr lang="fr-FR" dirty="0"/>
+              <a:t>Aplatissement</a:t>
+            </a:r>
+            <a:br>
+              <a:rPr lang="fr-FR" dirty="0"/>
+            </a:br>
+            <a:r>
+              <a:rPr lang="fr-FR" dirty="0"/>
+              <a:t>Cadre</a:t>
+            </a:r>
+          </a:p>
+        </p:txBody>
+      </p:sp>
+      <p:sp>
+        <p:nvSpPr>
+          <p:cNvPr id="4" name="Espace réservé du numéro de diapositive 3">
+            <a:extLst>
+              <a:ext uri="{FF2B5EF4-FFF2-40B4-BE49-F238E27FC236}">
+                <a16:creationId xmlns:a16="http://schemas.microsoft.com/office/drawing/2014/main" id="{6029C9D5-6CF9-416E-B4A7-47260C654709}"/>
+              </a:ext>
+            </a:extLst>
+          </p:cNvPr>
+          <p:cNvSpPr>
+            <a:spLocks noGrp="1"/>
+          </p:cNvSpPr>
+          <p:nvPr>
+            <p:ph type="sldNum" sz="quarter" idx="12"/>
+          </p:nvPr>
+        </p:nvSpPr>
+        <p:spPr/>
+        <p:txBody>
+          <a:bodyPr/>
+          <a:lstStyle/>
+          <a:p>
+            <a:fld id="{0EB16064-981D-404B-9686-DC1BCF903C68}" type="slidenum">
+              <a:rPr lang="fr-FR" smtClean="0"/>
+              <a:pPr/>
+              <a:t>16</a:t>
+            </a:fld>
+            <a:endParaRPr lang="fr-FR"/>
+          </a:p>
+        </p:txBody>
+      </p:sp>
+    </p:spTree>
+    <p:extLst>
+      <p:ext uri="{BB962C8B-B14F-4D97-AF65-F5344CB8AC3E}">
+        <p14:creationId xmlns:p14="http://schemas.microsoft.com/office/powerpoint/2010/main" val="3291618925"/>
+      </p:ext>
+    </p:extLst>
+  </p:cSld>
+  <p:clrMapOvr>
+    <a:masterClrMapping/>
+  </p:clrMapOvr>
+</p:sld>
+</file>
+
 <file path=ppt/slides/slide17.xml><?xml version="1.0" encoding="utf-8"?>
 <p:sld xmlns:a="http://schemas.openxmlformats.org/drawingml/2006/main" xmlns:r="http://schemas.openxmlformats.org/officeDocument/2006/relationships" xmlns:p="http://schemas.openxmlformats.org/presentationml/2006/main">
   <p:cSld>
@@ -6299,7 +6165,7 @@
           <p:cNvPr id="2" name="Titre 1">
             <a:extLst>
               <a:ext uri="{FF2B5EF4-FFF2-40B4-BE49-F238E27FC236}">
-                <a16:creationId xmlns:a16="http://schemas.microsoft.com/office/drawing/2014/main" id="{FADDA114-0720-47CB-A542-7C89182D4503}"/>
+                <a16:creationId xmlns:a16="http://schemas.microsoft.com/office/drawing/2014/main" id="{20921FC5-661D-4992-A1A4-D553BB1E927E}"/>
               </a:ext>
             </a:extLst>
           </p:cNvPr>
@@ -6312,57 +6178,41 @@
         </p:nvSpPr>
         <p:spPr/>
         <p:txBody>
-          <a:bodyPr>
-            <a:normAutofit/>
-          </a:bodyPr>
+          <a:bodyPr/>
+          <a:lstStyle/>
+          <a:p>
+            <a:r>
+              <a:rPr lang="fr-FR"/>
+              <a:t>Fabrication</a:t>
+            </a:r>
+            <a:endParaRPr lang="fr-FR" dirty="0"/>
+          </a:p>
+        </p:txBody>
+      </p:sp>
+      <p:sp>
+        <p:nvSpPr>
+          <p:cNvPr id="28" name="Espace réservé du contenu 27">
+            <a:extLst>
+              <a:ext uri="{FF2B5EF4-FFF2-40B4-BE49-F238E27FC236}">
+                <a16:creationId xmlns:a16="http://schemas.microsoft.com/office/drawing/2014/main" id="{73F83703-5839-4F1E-A24D-B1CF1BEA5064}"/>
+              </a:ext>
+            </a:extLst>
+          </p:cNvPr>
+          <p:cNvSpPr>
+            <a:spLocks noGrp="1"/>
+          </p:cNvSpPr>
+          <p:nvPr>
+            <p:ph idx="1"/>
+          </p:nvPr>
+        </p:nvSpPr>
+        <p:spPr/>
+        <p:txBody>
+          <a:bodyPr/>
           <a:lstStyle/>
           <a:p>
             <a:r>
               <a:rPr lang="fr-FR" dirty="0"/>
-              <a:t>Fabrication</a:t>
-            </a:r>
-          </a:p>
-        </p:txBody>
-      </p:sp>
-      <p:sp>
-        <p:nvSpPr>
-          <p:cNvPr id="3" name="Espace réservé du texte 2">
-            <a:extLst>
-              <a:ext uri="{FF2B5EF4-FFF2-40B4-BE49-F238E27FC236}">
-                <a16:creationId xmlns:a16="http://schemas.microsoft.com/office/drawing/2014/main" id="{8B13CBC0-C582-4596-BD45-751B4C3E9998}"/>
-              </a:ext>
-            </a:extLst>
-          </p:cNvPr>
-          <p:cNvSpPr>
-            <a:spLocks noGrp="1"/>
-          </p:cNvSpPr>
-          <p:nvPr>
-            <p:ph type="body" idx="1"/>
-          </p:nvPr>
-        </p:nvSpPr>
-        <p:spPr/>
-        <p:txBody>
-          <a:bodyPr/>
-          <a:lstStyle/>
-          <a:p>
-            <a:pPr lvl="1"/>
-            <a:r>
-              <a:rPr lang="fr-FR" dirty="0"/>
-              <a:t>Plateau</a:t>
-            </a:r>
-            <a:br>
-              <a:rPr lang="fr-FR" dirty="0"/>
-            </a:br>
-            <a:r>
-              <a:rPr lang="fr-FR" dirty="0"/>
-              <a:t>Aplatissement</a:t>
-            </a:r>
-            <a:br>
-              <a:rPr lang="fr-FR" dirty="0"/>
-            </a:br>
-            <a:r>
-              <a:rPr lang="fr-FR" dirty="0"/>
-              <a:t>Cadre</a:t>
+              <a:t>Grosse aide des animateurs d’Athis! </a:t>
             </a:r>
           </a:p>
         </p:txBody>
@@ -6372,7 +6222,7 @@
           <p:cNvPr id="4" name="Espace réservé du numéro de diapositive 3">
             <a:extLst>
               <a:ext uri="{FF2B5EF4-FFF2-40B4-BE49-F238E27FC236}">
-                <a16:creationId xmlns:a16="http://schemas.microsoft.com/office/drawing/2014/main" id="{6029C9D5-6CF9-416E-B4A7-47260C654709}"/>
+                <a16:creationId xmlns:a16="http://schemas.microsoft.com/office/drawing/2014/main" id="{601D15E8-6B01-4C95-BF12-4DB549BB3B0B}"/>
               </a:ext>
             </a:extLst>
           </p:cNvPr>
@@ -6392,123 +6242,6 @@
               <a:rPr lang="fr-FR" smtClean="0"/>
               <a:pPr/>
               <a:t>17</a:t>
-            </a:fld>
-            <a:endParaRPr lang="fr-FR"/>
-          </a:p>
-        </p:txBody>
-      </p:sp>
-    </p:spTree>
-    <p:extLst>
-      <p:ext uri="{BB962C8B-B14F-4D97-AF65-F5344CB8AC3E}">
-        <p14:creationId xmlns:p14="http://schemas.microsoft.com/office/powerpoint/2010/main" val="3291618925"/>
-      </p:ext>
-    </p:extLst>
-  </p:cSld>
-  <p:clrMapOvr>
-    <a:masterClrMapping/>
-  </p:clrMapOvr>
-</p:sld>
-</file>
-
-<file path=ppt/slides/slide18.xml><?xml version="1.0" encoding="utf-8"?>
-<p:sld xmlns:a="http://schemas.openxmlformats.org/drawingml/2006/main" xmlns:r="http://schemas.openxmlformats.org/officeDocument/2006/relationships" xmlns:p="http://schemas.openxmlformats.org/presentationml/2006/main">
-  <p:cSld>
-    <p:spTree>
-      <p:nvGrpSpPr>
-        <p:cNvPr id="1" name=""/>
-        <p:cNvGrpSpPr/>
-        <p:nvPr/>
-      </p:nvGrpSpPr>
-      <p:grpSpPr>
-        <a:xfrm>
-          <a:off x="0" y="0"/>
-          <a:ext cx="0" cy="0"/>
-          <a:chOff x="0" y="0"/>
-          <a:chExt cx="0" cy="0"/>
-        </a:xfrm>
-      </p:grpSpPr>
-      <p:sp>
-        <p:nvSpPr>
-          <p:cNvPr id="2" name="Titre 1">
-            <a:extLst>
-              <a:ext uri="{FF2B5EF4-FFF2-40B4-BE49-F238E27FC236}">
-                <a16:creationId xmlns:a16="http://schemas.microsoft.com/office/drawing/2014/main" id="{20921FC5-661D-4992-A1A4-D553BB1E927E}"/>
-              </a:ext>
-            </a:extLst>
-          </p:cNvPr>
-          <p:cNvSpPr>
-            <a:spLocks noGrp="1"/>
-          </p:cNvSpPr>
-          <p:nvPr>
-            <p:ph type="title"/>
-          </p:nvPr>
-        </p:nvSpPr>
-        <p:spPr/>
-        <p:txBody>
-          <a:bodyPr/>
-          <a:lstStyle/>
-          <a:p>
-            <a:r>
-              <a:rPr lang="fr-FR"/>
-              <a:t>Fabrication</a:t>
-            </a:r>
-            <a:endParaRPr lang="fr-FR" dirty="0"/>
-          </a:p>
-        </p:txBody>
-      </p:sp>
-      <p:sp>
-        <p:nvSpPr>
-          <p:cNvPr id="28" name="Espace réservé du contenu 27">
-            <a:extLst>
-              <a:ext uri="{FF2B5EF4-FFF2-40B4-BE49-F238E27FC236}">
-                <a16:creationId xmlns:a16="http://schemas.microsoft.com/office/drawing/2014/main" id="{73F83703-5839-4F1E-A24D-B1CF1BEA5064}"/>
-              </a:ext>
-            </a:extLst>
-          </p:cNvPr>
-          <p:cNvSpPr>
-            <a:spLocks noGrp="1"/>
-          </p:cNvSpPr>
-          <p:nvPr>
-            <p:ph idx="1"/>
-          </p:nvPr>
-        </p:nvSpPr>
-        <p:spPr/>
-        <p:txBody>
-          <a:bodyPr/>
-          <a:lstStyle/>
-          <a:p>
-            <a:r>
-              <a:rPr lang="fr-FR" dirty="0"/>
-              <a:t>Grosse aide des animateurs d’Athis! </a:t>
-            </a:r>
-          </a:p>
-        </p:txBody>
-      </p:sp>
-      <p:sp>
-        <p:nvSpPr>
-          <p:cNvPr id="4" name="Espace réservé du numéro de diapositive 3">
-            <a:extLst>
-              <a:ext uri="{FF2B5EF4-FFF2-40B4-BE49-F238E27FC236}">
-                <a16:creationId xmlns:a16="http://schemas.microsoft.com/office/drawing/2014/main" id="{601D15E8-6B01-4C95-BF12-4DB549BB3B0B}"/>
-              </a:ext>
-            </a:extLst>
-          </p:cNvPr>
-          <p:cNvSpPr>
-            <a:spLocks noGrp="1"/>
-          </p:cNvSpPr>
-          <p:nvPr>
-            <p:ph type="sldNum" sz="quarter" idx="12"/>
-          </p:nvPr>
-        </p:nvSpPr>
-        <p:spPr/>
-        <p:txBody>
-          <a:bodyPr/>
-          <a:lstStyle/>
-          <a:p>
-            <a:fld id="{0EB16064-981D-404B-9686-DC1BCF903C68}" type="slidenum">
-              <a:rPr lang="fr-FR" smtClean="0"/>
-              <a:pPr/>
-              <a:t>18</a:t>
             </a:fld>
             <a:endParaRPr lang="fr-FR"/>
           </a:p>
@@ -6967,7 +6700,7 @@
 </p:sld>
 </file>
 
-<file path=ppt/slides/slide19.xml><?xml version="1.0" encoding="utf-8"?>
+<file path=ppt/slides/slide18.xml><?xml version="1.0" encoding="utf-8"?>
 <p:sld xmlns:a="http://schemas.openxmlformats.org/drawingml/2006/main" xmlns:r="http://schemas.openxmlformats.org/officeDocument/2006/relationships" xmlns:p="http://schemas.openxmlformats.org/presentationml/2006/main">
   <p:cSld>
     <p:spTree>
@@ -7098,7 +6831,7 @@
           <a:p>
             <a:fld id="{0EB16064-981D-404B-9686-DC1BCF903C68}" type="slidenum">
               <a:rPr lang="fr-FR" smtClean="0"/>
-              <a:t>19</a:t>
+              <a:t>18</a:t>
             </a:fld>
             <a:endParaRPr lang="fr-FR"/>
           </a:p>
@@ -7108,6 +6841,157 @@
     <p:extLst>
       <p:ext uri="{BB962C8B-B14F-4D97-AF65-F5344CB8AC3E}">
         <p14:creationId xmlns:p14="http://schemas.microsoft.com/office/powerpoint/2010/main" val="3303819430"/>
+      </p:ext>
+    </p:extLst>
+  </p:cSld>
+  <p:clrMapOvr>
+    <a:masterClrMapping/>
+  </p:clrMapOvr>
+</p:sld>
+</file>
+
+<file path=ppt/slides/slide19.xml><?xml version="1.0" encoding="utf-8"?>
+<p:sld xmlns:a="http://schemas.openxmlformats.org/drawingml/2006/main" xmlns:r="http://schemas.openxmlformats.org/officeDocument/2006/relationships" xmlns:p="http://schemas.openxmlformats.org/presentationml/2006/main">
+  <p:cSld>
+    <p:spTree>
+      <p:nvGrpSpPr>
+        <p:cNvPr id="1" name=""/>
+        <p:cNvGrpSpPr/>
+        <p:nvPr/>
+      </p:nvGrpSpPr>
+      <p:grpSpPr>
+        <a:xfrm>
+          <a:off x="0" y="0"/>
+          <a:ext cx="0" cy="0"/>
+          <a:chOff x="0" y="0"/>
+          <a:chExt cx="0" cy="0"/>
+        </a:xfrm>
+      </p:grpSpPr>
+      <p:sp>
+        <p:nvSpPr>
+          <p:cNvPr id="2" name="Titre 1">
+            <a:extLst>
+              <a:ext uri="{FF2B5EF4-FFF2-40B4-BE49-F238E27FC236}">
+                <a16:creationId xmlns:a16="http://schemas.microsoft.com/office/drawing/2014/main" id="{20921FC5-661D-4992-A1A4-D553BB1E927E}"/>
+              </a:ext>
+            </a:extLst>
+          </p:cNvPr>
+          <p:cNvSpPr>
+            <a:spLocks noGrp="1"/>
+          </p:cNvSpPr>
+          <p:nvPr>
+            <p:ph type="title"/>
+          </p:nvPr>
+        </p:nvSpPr>
+        <p:spPr/>
+        <p:txBody>
+          <a:bodyPr/>
+          <a:lstStyle/>
+          <a:p>
+            <a:r>
+              <a:rPr lang="fr-FR" dirty="0"/>
+              <a:t>Fabrication</a:t>
+            </a:r>
+          </a:p>
+        </p:txBody>
+      </p:sp>
+      <p:sp>
+        <p:nvSpPr>
+          <p:cNvPr id="3" name="Espace réservé du contenu 2">
+            <a:extLst>
+              <a:ext uri="{FF2B5EF4-FFF2-40B4-BE49-F238E27FC236}">
+                <a16:creationId xmlns:a16="http://schemas.microsoft.com/office/drawing/2014/main" id="{39AA141A-C66A-4633-94F1-50F842D6E760}"/>
+              </a:ext>
+            </a:extLst>
+          </p:cNvPr>
+          <p:cNvSpPr>
+            <a:spLocks noGrp="1"/>
+          </p:cNvSpPr>
+          <p:nvPr>
+            <p:ph idx="1"/>
+          </p:nvPr>
+        </p:nvSpPr>
+        <p:spPr/>
+        <p:txBody>
+          <a:bodyPr/>
+          <a:lstStyle/>
+          <a:p>
+            <a:r>
+              <a:rPr lang="fr-FR" dirty="0"/>
+              <a:t>Assemblage</a:t>
+            </a:r>
+          </a:p>
+        </p:txBody>
+      </p:sp>
+      <p:sp>
+        <p:nvSpPr>
+          <p:cNvPr id="4" name="Espace réservé du numéro de diapositive 3">
+            <a:extLst>
+              <a:ext uri="{FF2B5EF4-FFF2-40B4-BE49-F238E27FC236}">
+                <a16:creationId xmlns:a16="http://schemas.microsoft.com/office/drawing/2014/main" id="{601D15E8-6B01-4C95-BF12-4DB549BB3B0B}"/>
+              </a:ext>
+            </a:extLst>
+          </p:cNvPr>
+          <p:cNvSpPr>
+            <a:spLocks noGrp="1"/>
+          </p:cNvSpPr>
+          <p:nvPr>
+            <p:ph type="sldNum" sz="quarter" idx="12"/>
+          </p:nvPr>
+        </p:nvSpPr>
+        <p:spPr/>
+        <p:txBody>
+          <a:bodyPr/>
+          <a:lstStyle/>
+          <a:p>
+            <a:fld id="{0EB16064-981D-404B-9686-DC1BCF903C68}" type="slidenum">
+              <a:rPr lang="fr-FR" smtClean="0"/>
+              <a:t>19</a:t>
+            </a:fld>
+            <a:endParaRPr lang="fr-FR"/>
+          </a:p>
+        </p:txBody>
+      </p:sp>
+      <p:pic>
+        <p:nvPicPr>
+          <p:cNvPr id="6" name="Image 5">
+            <a:extLst>
+              <a:ext uri="{FF2B5EF4-FFF2-40B4-BE49-F238E27FC236}">
+                <a16:creationId xmlns:a16="http://schemas.microsoft.com/office/drawing/2014/main" id="{1E895268-C511-4D11-A641-E2F82F0CF591}"/>
+              </a:ext>
+            </a:extLst>
+          </p:cNvPr>
+          <p:cNvPicPr>
+            <a:picLocks noChangeAspect="1"/>
+          </p:cNvPicPr>
+          <p:nvPr/>
+        </p:nvPicPr>
+        <p:blipFill>
+          <a:blip r:embed="rId2">
+            <a:extLst>
+              <a:ext uri="{28A0092B-C50C-407E-A947-70E740481C1C}">
+                <a14:useLocalDpi xmlns:a14="http://schemas.microsoft.com/office/drawing/2010/main" val="0"/>
+              </a:ext>
+            </a:extLst>
+          </a:blip>
+          <a:stretch>
+            <a:fillRect/>
+          </a:stretch>
+        </p:blipFill>
+        <p:spPr>
+          <a:xfrm>
+            <a:off x="0" y="1994985"/>
+            <a:ext cx="12192000" cy="4863015"/>
+          </a:xfrm>
+          <a:prstGeom prst="rect">
+            <a:avLst/>
+          </a:prstGeom>
+        </p:spPr>
+      </p:pic>
+    </p:spTree>
+    <p:extLst>
+      <p:ext uri="{BB962C8B-B14F-4D97-AF65-F5344CB8AC3E}">
+        <p14:creationId xmlns:p14="http://schemas.microsoft.com/office/powerpoint/2010/main" val="3311931305"/>
       </p:ext>
     </p:extLst>
   </p:cSld>
@@ -7343,7 +7227,7 @@
           <a:p>
             <a:r>
               <a:rPr lang="fr-FR" dirty="0"/>
-              <a:t>Assemblage</a:t>
+              <a:t>Finition/décoration</a:t>
             </a:r>
           </a:p>
         </p:txBody>
@@ -7372,157 +7256,6 @@
             <a:fld id="{0EB16064-981D-404B-9686-DC1BCF903C68}" type="slidenum">
               <a:rPr lang="fr-FR" smtClean="0"/>
               <a:t>20</a:t>
-            </a:fld>
-            <a:endParaRPr lang="fr-FR"/>
-          </a:p>
-        </p:txBody>
-      </p:sp>
-      <p:pic>
-        <p:nvPicPr>
-          <p:cNvPr id="6" name="Image 5">
-            <a:extLst>
-              <a:ext uri="{FF2B5EF4-FFF2-40B4-BE49-F238E27FC236}">
-                <a16:creationId xmlns:a16="http://schemas.microsoft.com/office/drawing/2014/main" id="{1E895268-C511-4D11-A641-E2F82F0CF591}"/>
-              </a:ext>
-            </a:extLst>
-          </p:cNvPr>
-          <p:cNvPicPr>
-            <a:picLocks noChangeAspect="1"/>
-          </p:cNvPicPr>
-          <p:nvPr/>
-        </p:nvPicPr>
-        <p:blipFill>
-          <a:blip r:embed="rId2">
-            <a:extLst>
-              <a:ext uri="{28A0092B-C50C-407E-A947-70E740481C1C}">
-                <a14:useLocalDpi xmlns:a14="http://schemas.microsoft.com/office/drawing/2010/main" val="0"/>
-              </a:ext>
-            </a:extLst>
-          </a:blip>
-          <a:stretch>
-            <a:fillRect/>
-          </a:stretch>
-        </p:blipFill>
-        <p:spPr>
-          <a:xfrm>
-            <a:off x="0" y="1994985"/>
-            <a:ext cx="12192000" cy="4863015"/>
-          </a:xfrm>
-          <a:prstGeom prst="rect">
-            <a:avLst/>
-          </a:prstGeom>
-        </p:spPr>
-      </p:pic>
-    </p:spTree>
-    <p:extLst>
-      <p:ext uri="{BB962C8B-B14F-4D97-AF65-F5344CB8AC3E}">
-        <p14:creationId xmlns:p14="http://schemas.microsoft.com/office/powerpoint/2010/main" val="3311931305"/>
-      </p:ext>
-    </p:extLst>
-  </p:cSld>
-  <p:clrMapOvr>
-    <a:masterClrMapping/>
-  </p:clrMapOvr>
-</p:sld>
-</file>
-
-<file path=ppt/slides/slide21.xml><?xml version="1.0" encoding="utf-8"?>
-<p:sld xmlns:a="http://schemas.openxmlformats.org/drawingml/2006/main" xmlns:r="http://schemas.openxmlformats.org/officeDocument/2006/relationships" xmlns:p="http://schemas.openxmlformats.org/presentationml/2006/main">
-  <p:cSld>
-    <p:spTree>
-      <p:nvGrpSpPr>
-        <p:cNvPr id="1" name=""/>
-        <p:cNvGrpSpPr/>
-        <p:nvPr/>
-      </p:nvGrpSpPr>
-      <p:grpSpPr>
-        <a:xfrm>
-          <a:off x="0" y="0"/>
-          <a:ext cx="0" cy="0"/>
-          <a:chOff x="0" y="0"/>
-          <a:chExt cx="0" cy="0"/>
-        </a:xfrm>
-      </p:grpSpPr>
-      <p:sp>
-        <p:nvSpPr>
-          <p:cNvPr id="2" name="Titre 1">
-            <a:extLst>
-              <a:ext uri="{FF2B5EF4-FFF2-40B4-BE49-F238E27FC236}">
-                <a16:creationId xmlns:a16="http://schemas.microsoft.com/office/drawing/2014/main" id="{20921FC5-661D-4992-A1A4-D553BB1E927E}"/>
-              </a:ext>
-            </a:extLst>
-          </p:cNvPr>
-          <p:cNvSpPr>
-            <a:spLocks noGrp="1"/>
-          </p:cNvSpPr>
-          <p:nvPr>
-            <p:ph type="title"/>
-          </p:nvPr>
-        </p:nvSpPr>
-        <p:spPr/>
-        <p:txBody>
-          <a:bodyPr/>
-          <a:lstStyle/>
-          <a:p>
-            <a:r>
-              <a:rPr lang="fr-FR" dirty="0"/>
-              <a:t>Fabrication</a:t>
-            </a:r>
-          </a:p>
-        </p:txBody>
-      </p:sp>
-      <p:sp>
-        <p:nvSpPr>
-          <p:cNvPr id="3" name="Espace réservé du contenu 2">
-            <a:extLst>
-              <a:ext uri="{FF2B5EF4-FFF2-40B4-BE49-F238E27FC236}">
-                <a16:creationId xmlns:a16="http://schemas.microsoft.com/office/drawing/2014/main" id="{39AA141A-C66A-4633-94F1-50F842D6E760}"/>
-              </a:ext>
-            </a:extLst>
-          </p:cNvPr>
-          <p:cNvSpPr>
-            <a:spLocks noGrp="1"/>
-          </p:cNvSpPr>
-          <p:nvPr>
-            <p:ph idx="1"/>
-          </p:nvPr>
-        </p:nvSpPr>
-        <p:spPr/>
-        <p:txBody>
-          <a:bodyPr/>
-          <a:lstStyle/>
-          <a:p>
-            <a:r>
-              <a:rPr lang="fr-FR" dirty="0"/>
-              <a:t>Finition/décoration</a:t>
-            </a:r>
-          </a:p>
-        </p:txBody>
-      </p:sp>
-      <p:sp>
-        <p:nvSpPr>
-          <p:cNvPr id="4" name="Espace réservé du numéro de diapositive 3">
-            <a:extLst>
-              <a:ext uri="{FF2B5EF4-FFF2-40B4-BE49-F238E27FC236}">
-                <a16:creationId xmlns:a16="http://schemas.microsoft.com/office/drawing/2014/main" id="{601D15E8-6B01-4C95-BF12-4DB549BB3B0B}"/>
-              </a:ext>
-            </a:extLst>
-          </p:cNvPr>
-          <p:cNvSpPr>
-            <a:spLocks noGrp="1"/>
-          </p:cNvSpPr>
-          <p:nvPr>
-            <p:ph type="sldNum" sz="quarter" idx="12"/>
-          </p:nvPr>
-        </p:nvSpPr>
-        <p:spPr/>
-        <p:txBody>
-          <a:bodyPr/>
-          <a:lstStyle/>
-          <a:p>
-            <a:fld id="{0EB16064-981D-404B-9686-DC1BCF903C68}" type="slidenum">
-              <a:rPr lang="fr-FR" smtClean="0"/>
-              <a:t>21</a:t>
             </a:fld>
             <a:endParaRPr lang="fr-FR"/>
           </a:p>
@@ -7577,6 +7310,140 @@
 </p:sld>
 </file>
 
+<file path=ppt/slides/slide21.xml><?xml version="1.0" encoding="utf-8"?>
+<p:sld xmlns:a="http://schemas.openxmlformats.org/drawingml/2006/main" xmlns:r="http://schemas.openxmlformats.org/officeDocument/2006/relationships" xmlns:p="http://schemas.openxmlformats.org/presentationml/2006/main">
+  <p:cSld>
+    <p:spTree>
+      <p:nvGrpSpPr>
+        <p:cNvPr id="1" name=""/>
+        <p:cNvGrpSpPr/>
+        <p:nvPr/>
+      </p:nvGrpSpPr>
+      <p:grpSpPr>
+        <a:xfrm>
+          <a:off x="0" y="0"/>
+          <a:ext cx="0" cy="0"/>
+          <a:chOff x="0" y="0"/>
+          <a:chExt cx="0" cy="0"/>
+        </a:xfrm>
+      </p:grpSpPr>
+      <p:sp>
+        <p:nvSpPr>
+          <p:cNvPr id="2" name="Titre 1">
+            <a:extLst>
+              <a:ext uri="{FF2B5EF4-FFF2-40B4-BE49-F238E27FC236}">
+                <a16:creationId xmlns:a16="http://schemas.microsoft.com/office/drawing/2014/main" id="{FADDA114-0720-47CB-A542-7C89182D4503}"/>
+              </a:ext>
+            </a:extLst>
+          </p:cNvPr>
+          <p:cNvSpPr>
+            <a:spLocks noGrp="1"/>
+          </p:cNvSpPr>
+          <p:nvPr>
+            <p:ph type="title"/>
+          </p:nvPr>
+        </p:nvSpPr>
+        <p:spPr/>
+        <p:txBody>
+          <a:bodyPr>
+            <a:normAutofit/>
+          </a:bodyPr>
+          <a:lstStyle/>
+          <a:p>
+            <a:r>
+              <a:rPr lang="fr-FR" dirty="0"/>
+              <a:t>6 mois après</a:t>
+            </a:r>
+          </a:p>
+        </p:txBody>
+      </p:sp>
+      <p:sp>
+        <p:nvSpPr>
+          <p:cNvPr id="3" name="Espace réservé du texte 2">
+            <a:extLst>
+              <a:ext uri="{FF2B5EF4-FFF2-40B4-BE49-F238E27FC236}">
+                <a16:creationId xmlns:a16="http://schemas.microsoft.com/office/drawing/2014/main" id="{8B13CBC0-C582-4596-BD45-751B4C3E9998}"/>
+              </a:ext>
+            </a:extLst>
+          </p:cNvPr>
+          <p:cNvSpPr>
+            <a:spLocks noGrp="1"/>
+          </p:cNvSpPr>
+          <p:nvPr>
+            <p:ph type="body" idx="1"/>
+          </p:nvPr>
+        </p:nvSpPr>
+        <p:spPr/>
+        <p:txBody>
+          <a:bodyPr/>
+          <a:lstStyle/>
+          <a:p>
+            <a:pPr lvl="1"/>
+            <a:r>
+              <a:rPr lang="fr-FR" dirty="0"/>
+              <a:t>De l’</a:t>
+            </a:r>
+            <a:r>
+              <a:rPr lang="fr-FR" dirty="0" err="1"/>
+              <a:t>interet</a:t>
+            </a:r>
+            <a:r>
+              <a:rPr lang="fr-FR" dirty="0"/>
+              <a:t> d’avoir un bois sec</a:t>
+            </a:r>
+          </a:p>
+          <a:p>
+            <a:pPr lvl="1"/>
+            <a:r>
+              <a:rPr lang="fr-FR" dirty="0"/>
+              <a:t>morale</a:t>
+            </a:r>
+          </a:p>
+        </p:txBody>
+      </p:sp>
+      <p:sp>
+        <p:nvSpPr>
+          <p:cNvPr id="4" name="Espace réservé du numéro de diapositive 3">
+            <a:extLst>
+              <a:ext uri="{FF2B5EF4-FFF2-40B4-BE49-F238E27FC236}">
+                <a16:creationId xmlns:a16="http://schemas.microsoft.com/office/drawing/2014/main" id="{6029C9D5-6CF9-416E-B4A7-47260C654709}"/>
+              </a:ext>
+            </a:extLst>
+          </p:cNvPr>
+          <p:cNvSpPr>
+            <a:spLocks noGrp="1"/>
+          </p:cNvSpPr>
+          <p:nvPr>
+            <p:ph type="sldNum" sz="quarter" idx="12"/>
+          </p:nvPr>
+        </p:nvSpPr>
+        <p:spPr/>
+        <p:txBody>
+          <a:bodyPr/>
+          <a:lstStyle/>
+          <a:p>
+            <a:fld id="{0EB16064-981D-404B-9686-DC1BCF903C68}" type="slidenum">
+              <a:rPr lang="fr-FR" smtClean="0"/>
+              <a:pPr/>
+              <a:t>21</a:t>
+            </a:fld>
+            <a:endParaRPr lang="fr-FR"/>
+          </a:p>
+        </p:txBody>
+      </p:sp>
+    </p:spTree>
+    <p:extLst>
+      <p:ext uri="{BB962C8B-B14F-4D97-AF65-F5344CB8AC3E}">
+        <p14:creationId xmlns:p14="http://schemas.microsoft.com/office/powerpoint/2010/main" val="1769661066"/>
+      </p:ext>
+    </p:extLst>
+  </p:cSld>
+  <p:clrMapOvr>
+    <a:masterClrMapping/>
+  </p:clrMapOvr>
+</p:sld>
+</file>
+
 <file path=ppt/slides/slide22.xml><?xml version="1.0" encoding="utf-8"?>
 <p:sld xmlns:a="http://schemas.openxmlformats.org/drawingml/2006/main" xmlns:r="http://schemas.openxmlformats.org/officeDocument/2006/relationships" xmlns:p="http://schemas.openxmlformats.org/presentationml/2006/main">
   <p:cSld>
@@ -7599,7 +7466,7 @@
           <p:cNvPr id="2" name="Titre 1">
             <a:extLst>
               <a:ext uri="{FF2B5EF4-FFF2-40B4-BE49-F238E27FC236}">
-                <a16:creationId xmlns:a16="http://schemas.microsoft.com/office/drawing/2014/main" id="{FADDA114-0720-47CB-A542-7C89182D4503}"/>
+                <a16:creationId xmlns:a16="http://schemas.microsoft.com/office/drawing/2014/main" id="{20921FC5-661D-4992-A1A4-D553BB1E927E}"/>
               </a:ext>
             </a:extLst>
           </p:cNvPr>
@@ -7612,58 +7479,65 @@
         </p:nvSpPr>
         <p:spPr/>
         <p:txBody>
-          <a:bodyPr>
-            <a:normAutofit/>
-          </a:bodyPr>
+          <a:bodyPr/>
           <a:lstStyle/>
           <a:p>
             <a:r>
               <a:rPr lang="fr-FR" dirty="0"/>
-              <a:t>6 mois après</a:t>
-            </a:r>
-          </a:p>
-        </p:txBody>
-      </p:sp>
-      <p:sp>
-        <p:nvSpPr>
-          <p:cNvPr id="3" name="Espace réservé du texte 2">
-            <a:extLst>
-              <a:ext uri="{FF2B5EF4-FFF2-40B4-BE49-F238E27FC236}">
-                <a16:creationId xmlns:a16="http://schemas.microsoft.com/office/drawing/2014/main" id="{8B13CBC0-C582-4596-BD45-751B4C3E9998}"/>
-              </a:ext>
-            </a:extLst>
-          </p:cNvPr>
-          <p:cNvSpPr>
-            <a:spLocks noGrp="1"/>
-          </p:cNvSpPr>
-          <p:nvPr>
-            <p:ph type="body" idx="1"/>
-          </p:nvPr>
-        </p:nvSpPr>
-        <p:spPr/>
-        <p:txBody>
-          <a:bodyPr/>
-          <a:lstStyle/>
+              <a:t>Fabrication</a:t>
+            </a:r>
+          </a:p>
+        </p:txBody>
+      </p:sp>
+      <p:sp>
+        <p:nvSpPr>
+          <p:cNvPr id="3" name="Espace réservé du contenu 2">
+            <a:extLst>
+              <a:ext uri="{FF2B5EF4-FFF2-40B4-BE49-F238E27FC236}">
+                <a16:creationId xmlns:a16="http://schemas.microsoft.com/office/drawing/2014/main" id="{39AA141A-C66A-4633-94F1-50F842D6E760}"/>
+              </a:ext>
+            </a:extLst>
+          </p:cNvPr>
+          <p:cNvSpPr>
+            <a:spLocks noGrp="1"/>
+          </p:cNvSpPr>
+          <p:nvPr>
+            <p:ph idx="1"/>
+          </p:nvPr>
+        </p:nvSpPr>
+        <p:spPr/>
+        <p:txBody>
+          <a:bodyPr/>
+          <a:lstStyle/>
+          <a:p>
+            <a:r>
+              <a:rPr lang="fr-FR" dirty="0"/>
+              <a:t>De l’intérêt d’avoir un bois sec</a:t>
+            </a:r>
+          </a:p>
           <a:p>
             <a:pPr lvl="1"/>
             <a:r>
               <a:rPr lang="fr-FR" dirty="0"/>
-              <a:t>De l’</a:t>
-            </a:r>
-            <a:r>
-              <a:rPr lang="fr-FR" dirty="0" err="1"/>
-              <a:t>interet</a:t>
-            </a:r>
+              <a:t>Des déformations / trous</a:t>
+            </a:r>
+          </a:p>
+          <a:p>
+            <a:pPr lvl="1"/>
             <a:r>
               <a:rPr lang="fr-FR" dirty="0"/>
-              <a:t> d’avoir un bois sec</a:t>
+              <a:t>Le bois acheté suintait au moment de la découpe!</a:t>
             </a:r>
           </a:p>
           <a:p>
             <a:pPr lvl="1"/>
+            <a:endParaRPr lang="fr-FR" dirty="0"/>
+          </a:p>
+          <a:p>
+            <a:pPr lvl="1"/>
             <a:r>
               <a:rPr lang="fr-FR" dirty="0"/>
-              <a:t>morale</a:t>
+              <a:t>Imprégnation huile sous vide?</a:t>
             </a:r>
           </a:p>
         </p:txBody>
@@ -7673,7 +7547,7 @@
           <p:cNvPr id="4" name="Espace réservé du numéro de diapositive 3">
             <a:extLst>
               <a:ext uri="{FF2B5EF4-FFF2-40B4-BE49-F238E27FC236}">
-                <a16:creationId xmlns:a16="http://schemas.microsoft.com/office/drawing/2014/main" id="{6029C9D5-6CF9-416E-B4A7-47260C654709}"/>
+                <a16:creationId xmlns:a16="http://schemas.microsoft.com/office/drawing/2014/main" id="{601D15E8-6B01-4C95-BF12-4DB549BB3B0B}"/>
               </a:ext>
             </a:extLst>
           </p:cNvPr>
@@ -7691,7 +7565,6 @@
           <a:p>
             <a:fld id="{0EB16064-981D-404B-9686-DC1BCF903C68}" type="slidenum">
               <a:rPr lang="fr-FR" smtClean="0"/>
-              <a:pPr/>
               <a:t>22</a:t>
             </a:fld>
             <a:endParaRPr lang="fr-FR"/>
@@ -7701,7 +7574,7 @@
     </p:spTree>
     <p:extLst>
       <p:ext uri="{BB962C8B-B14F-4D97-AF65-F5344CB8AC3E}">
-        <p14:creationId xmlns:p14="http://schemas.microsoft.com/office/powerpoint/2010/main" val="1769661066"/>
+        <p14:creationId xmlns:p14="http://schemas.microsoft.com/office/powerpoint/2010/main" val="1617815721"/>
       </p:ext>
     </p:extLst>
   </p:cSld>
@@ -7779,32 +7652,25 @@
           <a:p>
             <a:r>
               <a:rPr lang="fr-FR" dirty="0"/>
-              <a:t>De l’intérêt d’avoir un bois sec</a:t>
-            </a:r>
-          </a:p>
-          <a:p>
-            <a:pPr lvl="1"/>
+              <a:t>Morale</a:t>
+            </a:r>
+          </a:p>
+          <a:p>
+            <a:pPr marL="457200" lvl="1" indent="0">
+              <a:buNone/>
+            </a:pPr>
             <a:r>
               <a:rPr lang="fr-FR" dirty="0"/>
-              <a:t>Des déformations / trous</a:t>
-            </a:r>
-          </a:p>
-          <a:p>
-            <a:pPr lvl="1"/>
+              <a:t>Collage = essentiel</a:t>
+            </a:r>
+          </a:p>
+          <a:p>
+            <a:pPr marL="457200" lvl="1" indent="0">
+              <a:buNone/>
+            </a:pPr>
             <a:r>
               <a:rPr lang="fr-FR" dirty="0"/>
-              <a:t>Le bois acheté suintait au moment de la découpe!</a:t>
-            </a:r>
-          </a:p>
-          <a:p>
-            <a:pPr lvl="1"/>
-            <a:endParaRPr lang="fr-FR" dirty="0"/>
-          </a:p>
-          <a:p>
-            <a:pPr lvl="1"/>
-            <a:r>
-              <a:rPr lang="fr-FR" dirty="0"/>
-              <a:t>Imprégnation huile sous vide?</a:t>
+              <a:t>Dur à faire sur 12 planches à la fois</a:t>
             </a:r>
           </a:p>
         </p:txBody>
@@ -7841,7 +7707,7 @@
     </p:spTree>
     <p:extLst>
       <p:ext uri="{BB962C8B-B14F-4D97-AF65-F5344CB8AC3E}">
-        <p14:creationId xmlns:p14="http://schemas.microsoft.com/office/powerpoint/2010/main" val="1617815721"/>
+        <p14:creationId xmlns:p14="http://schemas.microsoft.com/office/powerpoint/2010/main" val="192260537"/>
       </p:ext>
     </p:extLst>
   </p:cSld>
@@ -7891,7 +7757,7 @@
           <a:p>
             <a:r>
               <a:rPr lang="fr-FR" dirty="0"/>
-              <a:t>Fabrication</a:t>
+              <a:t>Questions</a:t>
             </a:r>
           </a:p>
         </p:txBody>
@@ -7917,27 +7783,12 @@
           <a:bodyPr/>
           <a:lstStyle/>
           <a:p>
-            <a:r>
-              <a:rPr lang="fr-FR" dirty="0"/>
-              <a:t>Morale</a:t>
-            </a:r>
-          </a:p>
-          <a:p>
-            <a:pPr marL="457200" lvl="1" indent="0">
+            <a:pPr marL="0" indent="0">
               <a:buNone/>
             </a:pPr>
             <a:r>
               <a:rPr lang="fr-FR" dirty="0"/>
-              <a:t>Collage = essentiel</a:t>
-            </a:r>
-          </a:p>
-          <a:p>
-            <a:pPr marL="457200" lvl="1" indent="0">
-              <a:buNone/>
-            </a:pPr>
-            <a:r>
-              <a:rPr lang="fr-FR" dirty="0"/>
-              <a:t>Dur à faire sur 12 planches à la fois</a:t>
+              <a:t>Questions?</a:t>
             </a:r>
           </a:p>
         </p:txBody>
@@ -7966,124 +7817,6 @@
             <a:fld id="{0EB16064-981D-404B-9686-DC1BCF903C68}" type="slidenum">
               <a:rPr lang="fr-FR" smtClean="0"/>
               <a:t>24</a:t>
-            </a:fld>
-            <a:endParaRPr lang="fr-FR"/>
-          </a:p>
-        </p:txBody>
-      </p:sp>
-    </p:spTree>
-    <p:extLst>
-      <p:ext uri="{BB962C8B-B14F-4D97-AF65-F5344CB8AC3E}">
-        <p14:creationId xmlns:p14="http://schemas.microsoft.com/office/powerpoint/2010/main" val="192260537"/>
-      </p:ext>
-    </p:extLst>
-  </p:cSld>
-  <p:clrMapOvr>
-    <a:masterClrMapping/>
-  </p:clrMapOvr>
-</p:sld>
-</file>
-
-<file path=ppt/slides/slide25.xml><?xml version="1.0" encoding="utf-8"?>
-<p:sld xmlns:a="http://schemas.openxmlformats.org/drawingml/2006/main" xmlns:r="http://schemas.openxmlformats.org/officeDocument/2006/relationships" xmlns:p="http://schemas.openxmlformats.org/presentationml/2006/main">
-  <p:cSld>
-    <p:spTree>
-      <p:nvGrpSpPr>
-        <p:cNvPr id="1" name=""/>
-        <p:cNvGrpSpPr/>
-        <p:nvPr/>
-      </p:nvGrpSpPr>
-      <p:grpSpPr>
-        <a:xfrm>
-          <a:off x="0" y="0"/>
-          <a:ext cx="0" cy="0"/>
-          <a:chOff x="0" y="0"/>
-          <a:chExt cx="0" cy="0"/>
-        </a:xfrm>
-      </p:grpSpPr>
-      <p:sp>
-        <p:nvSpPr>
-          <p:cNvPr id="2" name="Titre 1">
-            <a:extLst>
-              <a:ext uri="{FF2B5EF4-FFF2-40B4-BE49-F238E27FC236}">
-                <a16:creationId xmlns:a16="http://schemas.microsoft.com/office/drawing/2014/main" id="{20921FC5-661D-4992-A1A4-D553BB1E927E}"/>
-              </a:ext>
-            </a:extLst>
-          </p:cNvPr>
-          <p:cNvSpPr>
-            <a:spLocks noGrp="1"/>
-          </p:cNvSpPr>
-          <p:nvPr>
-            <p:ph type="title"/>
-          </p:nvPr>
-        </p:nvSpPr>
-        <p:spPr/>
-        <p:txBody>
-          <a:bodyPr/>
-          <a:lstStyle/>
-          <a:p>
-            <a:r>
-              <a:rPr lang="fr-FR" dirty="0"/>
-              <a:t>Questions</a:t>
-            </a:r>
-          </a:p>
-        </p:txBody>
-      </p:sp>
-      <p:sp>
-        <p:nvSpPr>
-          <p:cNvPr id="3" name="Espace réservé du contenu 2">
-            <a:extLst>
-              <a:ext uri="{FF2B5EF4-FFF2-40B4-BE49-F238E27FC236}">
-                <a16:creationId xmlns:a16="http://schemas.microsoft.com/office/drawing/2014/main" id="{39AA141A-C66A-4633-94F1-50F842D6E760}"/>
-              </a:ext>
-            </a:extLst>
-          </p:cNvPr>
-          <p:cNvSpPr>
-            <a:spLocks noGrp="1"/>
-          </p:cNvSpPr>
-          <p:nvPr>
-            <p:ph idx="1"/>
-          </p:nvPr>
-        </p:nvSpPr>
-        <p:spPr/>
-        <p:txBody>
-          <a:bodyPr/>
-          <a:lstStyle/>
-          <a:p>
-            <a:pPr marL="0" indent="0">
-              <a:buNone/>
-            </a:pPr>
-            <a:r>
-              <a:rPr lang="fr-FR" dirty="0"/>
-              <a:t>Questions?</a:t>
-            </a:r>
-          </a:p>
-        </p:txBody>
-      </p:sp>
-      <p:sp>
-        <p:nvSpPr>
-          <p:cNvPr id="4" name="Espace réservé du numéro de diapositive 3">
-            <a:extLst>
-              <a:ext uri="{FF2B5EF4-FFF2-40B4-BE49-F238E27FC236}">
-                <a16:creationId xmlns:a16="http://schemas.microsoft.com/office/drawing/2014/main" id="{601D15E8-6B01-4C95-BF12-4DB549BB3B0B}"/>
-              </a:ext>
-            </a:extLst>
-          </p:cNvPr>
-          <p:cNvSpPr>
-            <a:spLocks noGrp="1"/>
-          </p:cNvSpPr>
-          <p:nvPr>
-            <p:ph type="sldNum" sz="quarter" idx="12"/>
-          </p:nvPr>
-        </p:nvSpPr>
-        <p:spPr/>
-        <p:txBody>
-          <a:bodyPr/>
-          <a:lstStyle/>
-          <a:p>
-            <a:fld id="{0EB16064-981D-404B-9686-DC1BCF903C68}" type="slidenum">
-              <a:rPr lang="fr-FR" smtClean="0"/>
-              <a:t>25</a:t>
             </a:fld>
             <a:endParaRPr lang="fr-FR"/>
           </a:p>

</xml_diff>